<commit_message>
Added Summary and learning resources
</commit_message>
<xml_diff>
--- a/slides/Despliegue continuo de tu infrastructura cloud con Azure ARM templates v2.pptx
+++ b/slides/Despliegue continuo de tu infrastructura cloud con Azure ARM templates v2.pptx
@@ -5,7 +5,7 @@
     <p:sldMasterId id="2147483733" r:id="rId2"/>
   </p:sldMasterIdLst>
   <p:notesMasterIdLst>
-    <p:notesMasterId r:id="rId18"/>
+    <p:notesMasterId r:id="rId21"/>
   </p:notesMasterIdLst>
   <p:sldIdLst>
     <p:sldId id="332" r:id="rId3"/>
@@ -13,16 +13,19 @@
     <p:sldId id="325" r:id="rId5"/>
     <p:sldId id="326" r:id="rId6"/>
     <p:sldId id="342" r:id="rId7"/>
-    <p:sldId id="334" r:id="rId8"/>
-    <p:sldId id="335" r:id="rId9"/>
-    <p:sldId id="336" r:id="rId10"/>
-    <p:sldId id="337" r:id="rId11"/>
-    <p:sldId id="338" r:id="rId12"/>
-    <p:sldId id="339" r:id="rId13"/>
-    <p:sldId id="340" r:id="rId14"/>
-    <p:sldId id="341" r:id="rId15"/>
-    <p:sldId id="295" r:id="rId16"/>
-    <p:sldId id="293" r:id="rId17"/>
+    <p:sldId id="344" r:id="rId8"/>
+    <p:sldId id="334" r:id="rId9"/>
+    <p:sldId id="335" r:id="rId10"/>
+    <p:sldId id="336" r:id="rId11"/>
+    <p:sldId id="337" r:id="rId12"/>
+    <p:sldId id="338" r:id="rId13"/>
+    <p:sldId id="339" r:id="rId14"/>
+    <p:sldId id="340" r:id="rId15"/>
+    <p:sldId id="341" r:id="rId16"/>
+    <p:sldId id="345" r:id="rId17"/>
+    <p:sldId id="343" r:id="rId18"/>
+    <p:sldId id="295" r:id="rId19"/>
+    <p:sldId id="293" r:id="rId20"/>
   </p:sldIdLst>
   <p:sldSz cx="9144000" cy="6858000" type="screen4x3"/>
   <p:notesSz cx="6858000" cy="9144000"/>
@@ -139,6 +142,7 @@
           <p14:sldIdLst>
             <p14:sldId id="326"/>
             <p14:sldId id="342"/>
+            <p14:sldId id="344"/>
             <p14:sldId id="334"/>
             <p14:sldId id="335"/>
             <p14:sldId id="336"/>
@@ -147,6 +151,8 @@
             <p14:sldId id="339"/>
             <p14:sldId id="340"/>
             <p14:sldId id="341"/>
+            <p14:sldId id="345"/>
+            <p14:sldId id="343"/>
           </p14:sldIdLst>
         </p14:section>
         <p14:section name="Ending" id="{40438540-D5F8-47EC-B1E3-0407946D06ED}">
@@ -263,7 +269,7 @@
           <a:p>
             <a:fld id="{EC13577B-6902-467D-A26C-08A0DD5E4E03}" type="datetimeFigureOut">
               <a:rPr lang="en-US" smtClean="0"/>
-              <a:t>19-Apr-18</a:t>
+              <a:t>21-Apr-18</a:t>
             </a:fld>
             <a:endParaRPr lang="en-US"/>
           </a:p>
@@ -873,7 +879,7 @@
           <a:p>
             <a:fld id="{DF61EA0F-A667-4B49-8422-0062BC55E249}" type="slidenum">
               <a:rPr lang="en-US" smtClean="0"/>
-              <a:t>14</a:t>
+              <a:t>17</a:t>
             </a:fld>
             <a:endParaRPr lang="en-US"/>
           </a:p>
@@ -962,7 +968,7 @@
           <a:p>
             <a:fld id="{DF61EA0F-A667-4B49-8422-0062BC55E249}" type="slidenum">
               <a:rPr lang="en-US" smtClean="0"/>
-              <a:t>15</a:t>
+              <a:t>18</a:t>
             </a:fld>
             <a:endParaRPr lang="en-US"/>
           </a:p>
@@ -3128,73 +3134,6 @@
           <a:chExt cx="0" cy="0"/>
         </a:xfrm>
       </p:grpSpPr>
-      <p:sp>
-        <p:nvSpPr>
-          <p:cNvPr id="7" name="Title 1"/>
-          <p:cNvSpPr txBox="1">
-            <a:spLocks/>
-          </p:cNvSpPr>
-          <p:nvPr userDrawn="1"/>
-        </p:nvSpPr>
-        <p:spPr>
-          <a:xfrm>
-            <a:off x="384449" y="922639"/>
-            <a:ext cx="3768799" cy="5015405"/>
-          </a:xfrm>
-          <a:prstGeom prst="rect">
-            <a:avLst/>
-          </a:prstGeom>
-          <a:noFill/>
-          <a:ln>
-            <a:noFill/>
-          </a:ln>
-          <a:extLst/>
-        </p:spPr>
-        <p:txBody>
-          <a:bodyPr vert="horz" wrap="square" lIns="288074" tIns="781916" rIns="1111144" bIns="781916" numCol="1" rtlCol="0" anchor="ctr" anchorCtr="0" compatLnSpc="1">
-            <a:prstTxWarp prst="textNoShape">
-              <a:avLst/>
-            </a:prstTxWarp>
-            <a:noAutofit/>
-          </a:bodyPr>
-          <a:lstStyle>
-            <a:lvl1pPr algn="l" defTabSz="914400" rtl="0" eaLnBrk="1" latinLnBrk="0" hangingPunct="1">
-              <a:lnSpc>
-                <a:spcPct val="90000"/>
-              </a:lnSpc>
-              <a:spcBef>
-                <a:spcPct val="0"/>
-              </a:spcBef>
-              <a:buNone/>
-              <a:defRPr lang="en-US" sz="6000" kern="1200" spc="-200" dirty="0">
-                <a:solidFill>
-                  <a:schemeClr val="bg1"/>
-                </a:solidFill>
-                <a:latin typeface="+mj-lt"/>
-                <a:ea typeface="+mj-ea"/>
-                <a:cs typeface="+mj-cs"/>
-              </a:defRPr>
-            </a:lvl1pPr>
-          </a:lstStyle>
-          <a:p>
-            <a:pPr defTabSz="685864" fontAlgn="base">
-              <a:lnSpc>
-                <a:spcPct val="100000"/>
-              </a:lnSpc>
-              <a:spcAft>
-                <a:spcPct val="0"/>
-              </a:spcAft>
-            </a:pPr>
-            <a:r>
-              <a:rPr lang="en-US" sz="4500">
-                <a:latin typeface="Segoe UI Light" panose="020B0502040204020203" pitchFamily="34" charset="0"/>
-                <a:cs typeface="Segoe UI Light" panose="020B0502040204020203" pitchFamily="34" charset="0"/>
-              </a:rPr>
-              <a:t>Click to edit Master title style</a:t>
-            </a:r>
-          </a:p>
-        </p:txBody>
-      </p:sp>
       <p:sp>
         <p:nvSpPr>
           <p:cNvPr id="10" name="Subtitle 2"/>
@@ -10200,7 +10139,7 @@
           <a:p>
             <a:fld id="{8BEEBAAA-29B5-4AF5-BC5F-7E580C29002D}" type="datetimeFigureOut">
               <a:rPr lang="en-US" smtClean="0"/>
-              <a:t>19-Apr-18</a:t>
+              <a:t>21-Apr-18</a:t>
             </a:fld>
             <a:endParaRPr lang="en-US"/>
           </a:p>
@@ -10733,7 +10672,7 @@
         </p:nvSpPr>
         <p:spPr>
           <a:xfrm>
-            <a:off x="272889" y="349652"/>
+            <a:off x="205981" y="377271"/>
             <a:ext cx="8309369" cy="994172"/>
           </a:xfrm>
         </p:spPr>
@@ -10743,17 +10682,17 @@
           <a:p>
             <a:r>
               <a:rPr lang="en-US" dirty="0"/>
-              <a:t>ARM Templates to rescue</a:t>
+              <a:t>… and per environment</a:t>
             </a:r>
           </a:p>
         </p:txBody>
       </p:sp>
       <p:pic>
         <p:nvPicPr>
-          <p:cNvPr id="5" name="Picture 4">
+          <p:cNvPr id="2" name="Picture 1">
             <a:extLst>
               <a:ext uri="{FF2B5EF4-FFF2-40B4-BE49-F238E27FC236}">
-                <a16:creationId xmlns:a16="http://schemas.microsoft.com/office/drawing/2014/main" id="{34FA5048-23E2-47AC-AE9F-9861FBBE6170}"/>
+                <a16:creationId xmlns:a16="http://schemas.microsoft.com/office/drawing/2014/main" id="{CB9A3D82-3A4B-49A4-A9F1-9D9E0B168E1A}"/>
               </a:ext>
             </a:extLst>
           </p:cNvPr>
@@ -10770,7 +10709,7 @@
         </p:blipFill>
         <p:spPr>
           <a:xfrm>
-            <a:off x="6261800" y="2125266"/>
+            <a:off x="205981" y="2125266"/>
             <a:ext cx="2723651" cy="1625852"/>
           </a:xfrm>
           <a:prstGeom prst="rect">
@@ -10830,7 +10769,7 @@
         </p:blipFill>
         <p:spPr>
           <a:xfrm>
-            <a:off x="5352193" y="2859223"/>
+            <a:off x="3233890" y="2125266"/>
             <a:ext cx="2723651" cy="1625852"/>
           </a:xfrm>
           <a:prstGeom prst="rect">
@@ -10868,48 +10807,12 @@
           </a:sp3d>
         </p:spPr>
       </p:pic>
-      <p:sp>
-        <p:nvSpPr>
-          <p:cNvPr id="7" name="TextBox 6">
-            <a:extLst>
-              <a:ext uri="{FF2B5EF4-FFF2-40B4-BE49-F238E27FC236}">
-                <a16:creationId xmlns:a16="http://schemas.microsoft.com/office/drawing/2014/main" id="{86A4BAF7-B668-4759-BD56-6B15F94B04E6}"/>
-              </a:ext>
-            </a:extLst>
-          </p:cNvPr>
-          <p:cNvSpPr txBox="1"/>
-          <p:nvPr/>
-        </p:nvSpPr>
-        <p:spPr>
-          <a:xfrm>
-            <a:off x="6924907" y="4550020"/>
-            <a:ext cx="1150937" cy="417713"/>
-          </a:xfrm>
-          <a:prstGeom prst="rect">
-            <a:avLst/>
-          </a:prstGeom>
-        </p:spPr>
-        <p:txBody>
-          <a:bodyPr vert="horz" wrap="square" lIns="68580" tIns="34290" rIns="68580" bIns="34290" rtlCol="0">
-            <a:noAutofit/>
-          </a:bodyPr>
-          <a:lstStyle/>
-          <a:p>
-            <a:pPr algn="r"/>
-            <a:r>
-              <a:rPr lang="es-ES" sz="2400" dirty="0"/>
-              <a:t>QA</a:t>
-            </a:r>
-            <a:endParaRPr lang="en-US" sz="2400" dirty="0"/>
-          </a:p>
-        </p:txBody>
-      </p:sp>
       <p:pic>
         <p:nvPicPr>
-          <p:cNvPr id="2" name="Picture 1">
+          <p:cNvPr id="5" name="Picture 4">
             <a:extLst>
               <a:ext uri="{FF2B5EF4-FFF2-40B4-BE49-F238E27FC236}">
-                <a16:creationId xmlns:a16="http://schemas.microsoft.com/office/drawing/2014/main" id="{CB9A3D82-3A4B-49A4-A9F1-9D9E0B168E1A}"/>
+                <a16:creationId xmlns:a16="http://schemas.microsoft.com/office/drawing/2014/main" id="{34FA5048-23E2-47AC-AE9F-9861FBBE6170}"/>
               </a:ext>
             </a:extLst>
           </p:cNvPr>
@@ -10926,7 +10829,7 @@
         </p:blipFill>
         <p:spPr>
           <a:xfrm>
-            <a:off x="4698862" y="3837809"/>
+            <a:off x="6261800" y="2125266"/>
             <a:ext cx="2723651" cy="1625852"/>
           </a:xfrm>
           <a:prstGeom prst="rect">
@@ -10966,10 +10869,10 @@
       </p:pic>
       <p:sp>
         <p:nvSpPr>
-          <p:cNvPr id="21" name="TextBox 20">
+          <p:cNvPr id="7" name="TextBox 6">
             <a:extLst>
               <a:ext uri="{FF2B5EF4-FFF2-40B4-BE49-F238E27FC236}">
-                <a16:creationId xmlns:a16="http://schemas.microsoft.com/office/drawing/2014/main" id="{C60DF88E-21D0-40E4-825F-F7C95ECE6D5A}"/>
+                <a16:creationId xmlns:a16="http://schemas.microsoft.com/office/drawing/2014/main" id="{86A4BAF7-B668-4759-BD56-6B15F94B04E6}"/>
               </a:ext>
             </a:extLst>
           </p:cNvPr>
@@ -10978,8 +10881,8 @@
         </p:nvSpPr>
         <p:spPr>
           <a:xfrm>
-            <a:off x="6261800" y="5593549"/>
-            <a:ext cx="1160713" cy="417713"/>
+            <a:off x="3233890" y="3881006"/>
+            <a:ext cx="2723651" cy="417713"/>
           </a:xfrm>
           <a:prstGeom prst="rect">
             <a:avLst/>
@@ -10991,10 +10894,10 @@
           </a:bodyPr>
           <a:lstStyle/>
           <a:p>
-            <a:pPr algn="r"/>
+            <a:pPr algn="ctr"/>
             <a:r>
               <a:rPr lang="es-ES" sz="2400" dirty="0"/>
-              <a:t>DEV</a:t>
+              <a:t>QA</a:t>
             </a:r>
             <a:endParaRPr lang="en-US" sz="2400" dirty="0"/>
           </a:p>
@@ -11002,10 +10905,10 @@
       </p:sp>
       <p:sp>
         <p:nvSpPr>
-          <p:cNvPr id="22" name="TextBox 21">
+          <p:cNvPr id="21" name="TextBox 20">
             <a:extLst>
               <a:ext uri="{FF2B5EF4-FFF2-40B4-BE49-F238E27FC236}">
-                <a16:creationId xmlns:a16="http://schemas.microsoft.com/office/drawing/2014/main" id="{4F0AEEF0-5D42-4DF5-AB60-DFB19F4FBA9A}"/>
+                <a16:creationId xmlns:a16="http://schemas.microsoft.com/office/drawing/2014/main" id="{C60DF88E-21D0-40E4-825F-F7C95ECE6D5A}"/>
               </a:ext>
             </a:extLst>
           </p:cNvPr>
@@ -11014,8 +10917,44 @@
         </p:nvSpPr>
         <p:spPr>
           <a:xfrm>
-            <a:off x="7308597" y="3826034"/>
-            <a:ext cx="1676854" cy="417713"/>
+            <a:off x="205981" y="3881006"/>
+            <a:ext cx="2723651" cy="417713"/>
+          </a:xfrm>
+          <a:prstGeom prst="rect">
+            <a:avLst/>
+          </a:prstGeom>
+        </p:spPr>
+        <p:txBody>
+          <a:bodyPr vert="horz" wrap="square" lIns="68580" tIns="34290" rIns="68580" bIns="34290" rtlCol="0">
+            <a:noAutofit/>
+          </a:bodyPr>
+          <a:lstStyle/>
+          <a:p>
+            <a:pPr algn="ctr"/>
+            <a:r>
+              <a:rPr lang="es-ES" sz="2400" dirty="0"/>
+              <a:t>DEV</a:t>
+            </a:r>
+            <a:endParaRPr lang="en-US" sz="2400" dirty="0"/>
+          </a:p>
+        </p:txBody>
+      </p:sp>
+      <p:sp>
+        <p:nvSpPr>
+          <p:cNvPr id="22" name="TextBox 21">
+            <a:extLst>
+              <a:ext uri="{FF2B5EF4-FFF2-40B4-BE49-F238E27FC236}">
+                <a16:creationId xmlns:a16="http://schemas.microsoft.com/office/drawing/2014/main" id="{4F0AEEF0-5D42-4DF5-AB60-DFB19F4FBA9A}"/>
+              </a:ext>
+            </a:extLst>
+          </p:cNvPr>
+          <p:cNvSpPr txBox="1"/>
+          <p:nvPr/>
+        </p:nvSpPr>
+        <p:spPr>
+          <a:xfrm>
+            <a:off x="6261800" y="3881006"/>
+            <a:ext cx="2723651" cy="417713"/>
           </a:xfrm>
           <a:prstGeom prst="rect">
             <a:avLst/>
@@ -11027,7 +10966,7 @@
           </a:bodyPr>
           <a:lstStyle/>
           <a:p>
-            <a:pPr algn="r"/>
+            <a:pPr algn="ctr"/>
             <a:r>
               <a:rPr lang="es-ES" sz="2100" dirty="0"/>
               <a:t>PROD</a:t>
@@ -11038,10 +10977,10 @@
       </p:sp>
       <p:pic>
         <p:nvPicPr>
-          <p:cNvPr id="11" name="Picture 10">
+          <p:cNvPr id="8" name="Picture 7">
             <a:extLst>
               <a:ext uri="{FF2B5EF4-FFF2-40B4-BE49-F238E27FC236}">
-                <a16:creationId xmlns:a16="http://schemas.microsoft.com/office/drawing/2014/main" id="{EB6B9E15-F341-4B0A-BCD4-0ACC5E86E23A}"/>
+                <a16:creationId xmlns:a16="http://schemas.microsoft.com/office/drawing/2014/main" id="{454FCC22-BFD5-496E-A30C-7B0F7D9D0473}"/>
               </a:ext>
             </a:extLst>
           </p:cNvPr>
@@ -11051,15 +10990,189 @@
           <p:nvPr/>
         </p:nvPicPr>
         <p:blipFill>
-          <a:blip r:embed="rId3"/>
+          <a:blip r:embed="rId3">
+            <a:extLst>
+              <a:ext uri="{28A0092B-C50C-407E-A947-70E740481C1C}">
+                <a14:useLocalDpi xmlns:a14="http://schemas.microsoft.com/office/drawing/2010/main" val="0"/>
+              </a:ext>
+            </a:extLst>
+          </a:blip>
           <a:stretch>
             <a:fillRect/>
           </a:stretch>
         </p:blipFill>
         <p:spPr>
           <a:xfrm>
-            <a:off x="1201287" y="2872447"/>
-            <a:ext cx="1776031" cy="2397083"/>
+            <a:off x="3338416" y="3881005"/>
+            <a:ext cx="2514600" cy="1785938"/>
+          </a:xfrm>
+          <a:prstGeom prst="rect">
+            <a:avLst/>
+          </a:prstGeom>
+        </p:spPr>
+      </p:pic>
+    </p:spTree>
+    <p:extLst>
+      <p:ext uri="{BB962C8B-B14F-4D97-AF65-F5344CB8AC3E}">
+        <p14:creationId xmlns:p14="http://schemas.microsoft.com/office/powerpoint/2010/main" val="2858387605"/>
+      </p:ext>
+    </p:extLst>
+  </p:cSld>
+  <p:clrMapOvr>
+    <a:masterClrMapping/>
+  </p:clrMapOvr>
+  <p:timing>
+    <p:tnLst>
+      <p:par>
+        <p:cTn id="1" dur="indefinite" restart="never" nodeType="tmRoot">
+          <p:childTnLst>
+            <p:seq concurrent="1" nextAc="seek">
+              <p:cTn id="2" dur="indefinite" nodeType="mainSeq">
+                <p:childTnLst>
+                  <p:par>
+                    <p:cTn id="3" fill="hold">
+                      <p:stCondLst>
+                        <p:cond delay="indefinite"/>
+                      </p:stCondLst>
+                      <p:childTnLst>
+                        <p:par>
+                          <p:cTn id="4" fill="hold">
+                            <p:stCondLst>
+                              <p:cond delay="0"/>
+                            </p:stCondLst>
+                            <p:childTnLst>
+                              <p:par>
+                                <p:cTn id="5" presetID="1" presetClass="entr" presetSubtype="0" fill="hold" nodeType="clickEffect">
+                                  <p:stCondLst>
+                                    <p:cond delay="0"/>
+                                  </p:stCondLst>
+                                  <p:childTnLst>
+                                    <p:set>
+                                      <p:cBhvr>
+                                        <p:cTn id="6" dur="1" fill="hold">
+                                          <p:stCondLst>
+                                            <p:cond delay="0"/>
+                                          </p:stCondLst>
+                                        </p:cTn>
+                                        <p:tgtEl>
+                                          <p:spTgt spid="8"/>
+                                        </p:tgtEl>
+                                        <p:attrNameLst>
+                                          <p:attrName>style.visibility</p:attrName>
+                                        </p:attrNameLst>
+                                      </p:cBhvr>
+                                      <p:to>
+                                        <p:strVal val="visible"/>
+                                      </p:to>
+                                    </p:set>
+                                  </p:childTnLst>
+                                </p:cTn>
+                              </p:par>
+                            </p:childTnLst>
+                          </p:cTn>
+                        </p:par>
+                      </p:childTnLst>
+                    </p:cTn>
+                  </p:par>
+                </p:childTnLst>
+              </p:cTn>
+              <p:prevCondLst>
+                <p:cond evt="onPrev" delay="0">
+                  <p:tgtEl>
+                    <p:sldTgt/>
+                  </p:tgtEl>
+                </p:cond>
+              </p:prevCondLst>
+              <p:nextCondLst>
+                <p:cond evt="onNext" delay="0">
+                  <p:tgtEl>
+                    <p:sldTgt/>
+                  </p:tgtEl>
+                </p:cond>
+              </p:nextCondLst>
+            </p:seq>
+          </p:childTnLst>
+        </p:cTn>
+      </p:par>
+    </p:tnLst>
+  </p:timing>
+</p:sld>
+</file>
+
+<file path=ppt/slides/slide11.xml><?xml version="1.0" encoding="utf-8"?>
+<p:sld xmlns:a="http://schemas.openxmlformats.org/drawingml/2006/main" xmlns:r="http://schemas.openxmlformats.org/officeDocument/2006/relationships" xmlns:p="http://schemas.openxmlformats.org/presentationml/2006/main">
+  <p:cSld>
+    <p:spTree>
+      <p:nvGrpSpPr>
+        <p:cNvPr id="1" name=""/>
+        <p:cNvGrpSpPr/>
+        <p:nvPr/>
+      </p:nvGrpSpPr>
+      <p:grpSpPr>
+        <a:xfrm>
+          <a:off x="0" y="0"/>
+          <a:ext cx="0" cy="0"/>
+          <a:chOff x="0" y="0"/>
+          <a:chExt cx="0" cy="0"/>
+        </a:xfrm>
+      </p:grpSpPr>
+      <p:sp>
+        <p:nvSpPr>
+          <p:cNvPr id="3" name="Title 2">
+            <a:extLst>
+              <a:ext uri="{FF2B5EF4-FFF2-40B4-BE49-F238E27FC236}">
+                <a16:creationId xmlns:a16="http://schemas.microsoft.com/office/drawing/2014/main" id="{1AB88118-3C4F-497A-89A9-11D1CAEC39BC}"/>
+              </a:ext>
+            </a:extLst>
+          </p:cNvPr>
+          <p:cNvSpPr>
+            <a:spLocks noGrp="1"/>
+          </p:cNvSpPr>
+          <p:nvPr>
+            <p:ph type="title"/>
+          </p:nvPr>
+        </p:nvSpPr>
+        <p:spPr>
+          <a:xfrm>
+            <a:off x="272889" y="349652"/>
+            <a:ext cx="8309369" cy="994172"/>
+          </a:xfrm>
+        </p:spPr>
+        <p:txBody>
+          <a:bodyPr/>
+          <a:lstStyle/>
+          <a:p>
+            <a:r>
+              <a:rPr lang="en-US" dirty="0"/>
+              <a:t>ARM Templates to rescue</a:t>
+            </a:r>
+          </a:p>
+        </p:txBody>
+      </p:sp>
+      <p:pic>
+        <p:nvPicPr>
+          <p:cNvPr id="5" name="Picture 4">
+            <a:extLst>
+              <a:ext uri="{FF2B5EF4-FFF2-40B4-BE49-F238E27FC236}">
+                <a16:creationId xmlns:a16="http://schemas.microsoft.com/office/drawing/2014/main" id="{34FA5048-23E2-47AC-AE9F-9861FBBE6170}"/>
+              </a:ext>
+            </a:extLst>
+          </p:cNvPr>
+          <p:cNvPicPr>
+            <a:picLocks noChangeAspect="1"/>
+          </p:cNvPicPr>
+          <p:nvPr/>
+        </p:nvPicPr>
+        <p:blipFill>
+          <a:blip r:embed="rId2"/>
+          <a:stretch>
+            <a:fillRect/>
+          </a:stretch>
+        </p:blipFill>
+        <p:spPr>
+          <a:xfrm>
+            <a:off x="6261800" y="2125266"/>
+            <a:ext cx="2723651" cy="1625852"/>
           </a:xfrm>
           <a:prstGeom prst="rect">
             <a:avLst/>
@@ -11098,6 +11211,294 @@
       </p:pic>
       <p:pic>
         <p:nvPicPr>
+          <p:cNvPr id="4" name="Picture 3">
+            <a:extLst>
+              <a:ext uri="{FF2B5EF4-FFF2-40B4-BE49-F238E27FC236}">
+                <a16:creationId xmlns:a16="http://schemas.microsoft.com/office/drawing/2014/main" id="{DF563D7A-BC87-4596-BA17-CEBBE3E6EAD1}"/>
+              </a:ext>
+            </a:extLst>
+          </p:cNvPr>
+          <p:cNvPicPr>
+            <a:picLocks noChangeAspect="1"/>
+          </p:cNvPicPr>
+          <p:nvPr/>
+        </p:nvPicPr>
+        <p:blipFill>
+          <a:blip r:embed="rId2"/>
+          <a:stretch>
+            <a:fillRect/>
+          </a:stretch>
+        </p:blipFill>
+        <p:spPr>
+          <a:xfrm>
+            <a:off x="5352193" y="2859223"/>
+            <a:ext cx="2723651" cy="1625852"/>
+          </a:xfrm>
+          <a:prstGeom prst="rect">
+            <a:avLst/>
+          </a:prstGeom>
+          <a:solidFill>
+            <a:srgbClr val="FFFFFF">
+              <a:shade val="85000"/>
+            </a:srgbClr>
+          </a:solidFill>
+          <a:ln w="88900" cap="sq">
+            <a:solidFill>
+              <a:srgbClr val="FFFFFF"/>
+            </a:solidFill>
+            <a:miter lim="800000"/>
+          </a:ln>
+          <a:effectLst>
+            <a:outerShdw blurRad="55000" dist="18000" dir="5400000" algn="tl" rotWithShape="0">
+              <a:srgbClr val="000000">
+                <a:alpha val="40000"/>
+              </a:srgbClr>
+            </a:outerShdw>
+          </a:effectLst>
+          <a:scene3d>
+            <a:camera prst="orthographicFront"/>
+            <a:lightRig rig="twoPt" dir="t">
+              <a:rot lat="0" lon="0" rev="7200000"/>
+            </a:lightRig>
+          </a:scene3d>
+          <a:sp3d>
+            <a:bevelT w="25400" h="19050"/>
+            <a:contourClr>
+              <a:srgbClr val="FFFFFF"/>
+            </a:contourClr>
+          </a:sp3d>
+        </p:spPr>
+      </p:pic>
+      <p:sp>
+        <p:nvSpPr>
+          <p:cNvPr id="7" name="TextBox 6">
+            <a:extLst>
+              <a:ext uri="{FF2B5EF4-FFF2-40B4-BE49-F238E27FC236}">
+                <a16:creationId xmlns:a16="http://schemas.microsoft.com/office/drawing/2014/main" id="{86A4BAF7-B668-4759-BD56-6B15F94B04E6}"/>
+              </a:ext>
+            </a:extLst>
+          </p:cNvPr>
+          <p:cNvSpPr txBox="1"/>
+          <p:nvPr/>
+        </p:nvSpPr>
+        <p:spPr>
+          <a:xfrm>
+            <a:off x="6924907" y="4550020"/>
+            <a:ext cx="1150937" cy="417713"/>
+          </a:xfrm>
+          <a:prstGeom prst="rect">
+            <a:avLst/>
+          </a:prstGeom>
+        </p:spPr>
+        <p:txBody>
+          <a:bodyPr vert="horz" wrap="square" lIns="68580" tIns="34290" rIns="68580" bIns="34290" rtlCol="0">
+            <a:noAutofit/>
+          </a:bodyPr>
+          <a:lstStyle/>
+          <a:p>
+            <a:pPr algn="r"/>
+            <a:r>
+              <a:rPr lang="es-ES" sz="2400" dirty="0"/>
+              <a:t>QA</a:t>
+            </a:r>
+            <a:endParaRPr lang="en-US" sz="2400" dirty="0"/>
+          </a:p>
+        </p:txBody>
+      </p:sp>
+      <p:pic>
+        <p:nvPicPr>
+          <p:cNvPr id="2" name="Picture 1">
+            <a:extLst>
+              <a:ext uri="{FF2B5EF4-FFF2-40B4-BE49-F238E27FC236}">
+                <a16:creationId xmlns:a16="http://schemas.microsoft.com/office/drawing/2014/main" id="{CB9A3D82-3A4B-49A4-A9F1-9D9E0B168E1A}"/>
+              </a:ext>
+            </a:extLst>
+          </p:cNvPr>
+          <p:cNvPicPr>
+            <a:picLocks noChangeAspect="1"/>
+          </p:cNvPicPr>
+          <p:nvPr/>
+        </p:nvPicPr>
+        <p:blipFill>
+          <a:blip r:embed="rId2"/>
+          <a:stretch>
+            <a:fillRect/>
+          </a:stretch>
+        </p:blipFill>
+        <p:spPr>
+          <a:xfrm>
+            <a:off x="4698862" y="3837809"/>
+            <a:ext cx="2723651" cy="1625852"/>
+          </a:xfrm>
+          <a:prstGeom prst="rect">
+            <a:avLst/>
+          </a:prstGeom>
+          <a:solidFill>
+            <a:srgbClr val="FFFFFF">
+              <a:shade val="85000"/>
+            </a:srgbClr>
+          </a:solidFill>
+          <a:ln w="88900" cap="sq">
+            <a:solidFill>
+              <a:srgbClr val="FFFFFF"/>
+            </a:solidFill>
+            <a:miter lim="800000"/>
+          </a:ln>
+          <a:effectLst>
+            <a:outerShdw blurRad="55000" dist="18000" dir="5400000" algn="tl" rotWithShape="0">
+              <a:srgbClr val="000000">
+                <a:alpha val="40000"/>
+              </a:srgbClr>
+            </a:outerShdw>
+          </a:effectLst>
+          <a:scene3d>
+            <a:camera prst="orthographicFront"/>
+            <a:lightRig rig="twoPt" dir="t">
+              <a:rot lat="0" lon="0" rev="7200000"/>
+            </a:lightRig>
+          </a:scene3d>
+          <a:sp3d>
+            <a:bevelT w="25400" h="19050"/>
+            <a:contourClr>
+              <a:srgbClr val="FFFFFF"/>
+            </a:contourClr>
+          </a:sp3d>
+        </p:spPr>
+      </p:pic>
+      <p:sp>
+        <p:nvSpPr>
+          <p:cNvPr id="21" name="TextBox 20">
+            <a:extLst>
+              <a:ext uri="{FF2B5EF4-FFF2-40B4-BE49-F238E27FC236}">
+                <a16:creationId xmlns:a16="http://schemas.microsoft.com/office/drawing/2014/main" id="{C60DF88E-21D0-40E4-825F-F7C95ECE6D5A}"/>
+              </a:ext>
+            </a:extLst>
+          </p:cNvPr>
+          <p:cNvSpPr txBox="1"/>
+          <p:nvPr/>
+        </p:nvSpPr>
+        <p:spPr>
+          <a:xfrm>
+            <a:off x="6261800" y="5593549"/>
+            <a:ext cx="1160713" cy="417713"/>
+          </a:xfrm>
+          <a:prstGeom prst="rect">
+            <a:avLst/>
+          </a:prstGeom>
+        </p:spPr>
+        <p:txBody>
+          <a:bodyPr vert="horz" wrap="square" lIns="68580" tIns="34290" rIns="68580" bIns="34290" rtlCol="0">
+            <a:noAutofit/>
+          </a:bodyPr>
+          <a:lstStyle/>
+          <a:p>
+            <a:pPr algn="r"/>
+            <a:r>
+              <a:rPr lang="es-ES" sz="2400" dirty="0"/>
+              <a:t>DEV</a:t>
+            </a:r>
+            <a:endParaRPr lang="en-US" sz="2400" dirty="0"/>
+          </a:p>
+        </p:txBody>
+      </p:sp>
+      <p:sp>
+        <p:nvSpPr>
+          <p:cNvPr id="22" name="TextBox 21">
+            <a:extLst>
+              <a:ext uri="{FF2B5EF4-FFF2-40B4-BE49-F238E27FC236}">
+                <a16:creationId xmlns:a16="http://schemas.microsoft.com/office/drawing/2014/main" id="{4F0AEEF0-5D42-4DF5-AB60-DFB19F4FBA9A}"/>
+              </a:ext>
+            </a:extLst>
+          </p:cNvPr>
+          <p:cNvSpPr txBox="1"/>
+          <p:nvPr/>
+        </p:nvSpPr>
+        <p:spPr>
+          <a:xfrm>
+            <a:off x="7308597" y="3826034"/>
+            <a:ext cx="1676854" cy="417713"/>
+          </a:xfrm>
+          <a:prstGeom prst="rect">
+            <a:avLst/>
+          </a:prstGeom>
+        </p:spPr>
+        <p:txBody>
+          <a:bodyPr vert="horz" wrap="square" lIns="68580" tIns="34290" rIns="68580" bIns="34290" rtlCol="0">
+            <a:normAutofit/>
+          </a:bodyPr>
+          <a:lstStyle/>
+          <a:p>
+            <a:pPr algn="r"/>
+            <a:r>
+              <a:rPr lang="es-ES" sz="2100" dirty="0"/>
+              <a:t>PROD</a:t>
+            </a:r>
+            <a:endParaRPr lang="en-US" sz="2100" dirty="0"/>
+          </a:p>
+        </p:txBody>
+      </p:sp>
+      <p:pic>
+        <p:nvPicPr>
+          <p:cNvPr id="11" name="Picture 10">
+            <a:extLst>
+              <a:ext uri="{FF2B5EF4-FFF2-40B4-BE49-F238E27FC236}">
+                <a16:creationId xmlns:a16="http://schemas.microsoft.com/office/drawing/2014/main" id="{EB6B9E15-F341-4B0A-BCD4-0ACC5E86E23A}"/>
+              </a:ext>
+            </a:extLst>
+          </p:cNvPr>
+          <p:cNvPicPr>
+            <a:picLocks noChangeAspect="1"/>
+          </p:cNvPicPr>
+          <p:nvPr/>
+        </p:nvPicPr>
+        <p:blipFill>
+          <a:blip r:embed="rId3"/>
+          <a:stretch>
+            <a:fillRect/>
+          </a:stretch>
+        </p:blipFill>
+        <p:spPr>
+          <a:xfrm>
+            <a:off x="1201287" y="2872447"/>
+            <a:ext cx="1776031" cy="2397083"/>
+          </a:xfrm>
+          <a:prstGeom prst="rect">
+            <a:avLst/>
+          </a:prstGeom>
+          <a:solidFill>
+            <a:srgbClr val="FFFFFF">
+              <a:shade val="85000"/>
+            </a:srgbClr>
+          </a:solidFill>
+          <a:ln w="88900" cap="sq">
+            <a:solidFill>
+              <a:srgbClr val="FFFFFF"/>
+            </a:solidFill>
+            <a:miter lim="800000"/>
+          </a:ln>
+          <a:effectLst>
+            <a:outerShdw blurRad="55000" dist="18000" dir="5400000" algn="tl" rotWithShape="0">
+              <a:srgbClr val="000000">
+                <a:alpha val="40000"/>
+              </a:srgbClr>
+            </a:outerShdw>
+          </a:effectLst>
+          <a:scene3d>
+            <a:camera prst="orthographicFront"/>
+            <a:lightRig rig="twoPt" dir="t">
+              <a:rot lat="0" lon="0" rev="7200000"/>
+            </a:lightRig>
+          </a:scene3d>
+          <a:sp3d>
+            <a:bevelT w="25400" h="19050"/>
+            <a:contourClr>
+              <a:srgbClr val="FFFFFF"/>
+            </a:contourClr>
+          </a:sp3d>
+        </p:spPr>
+      </p:pic>
+      <p:pic>
+        <p:nvPicPr>
           <p:cNvPr id="1026" name="Picture 2" descr="Image result for azure resource group logo">
             <a:extLst>
               <a:ext uri="{FF2B5EF4-FFF2-40B4-BE49-F238E27FC236}">
@@ -11304,7 +11705,7 @@
 </p:sld>
 </file>
 
-<file path=ppt/slides/slide11.xml><?xml version="1.0" encoding="utf-8"?>
+<file path=ppt/slides/slide12.xml><?xml version="1.0" encoding="utf-8"?>
 <p:sld xmlns:a="http://schemas.openxmlformats.org/drawingml/2006/main" xmlns:r="http://schemas.openxmlformats.org/officeDocument/2006/relationships" xmlns:p="http://schemas.openxmlformats.org/presentationml/2006/main">
   <p:cSld>
     <p:spTree>
@@ -11362,7 +11763,7 @@
 </p:sld>
 </file>
 
-<file path=ppt/slides/slide12.xml><?xml version="1.0" encoding="utf-8"?>
+<file path=ppt/slides/slide13.xml><?xml version="1.0" encoding="utf-8"?>
 <p:sld xmlns:a="http://schemas.openxmlformats.org/drawingml/2006/main" xmlns:r="http://schemas.openxmlformats.org/officeDocument/2006/relationships" xmlns:p="http://schemas.openxmlformats.org/presentationml/2006/main">
   <p:cSld>
     <p:spTree>
@@ -11965,7 +12366,7 @@
 </p:sld>
 </file>
 
-<file path=ppt/slides/slide13.xml><?xml version="1.0" encoding="utf-8"?>
+<file path=ppt/slides/slide14.xml><?xml version="1.0" encoding="utf-8"?>
 <p:sld xmlns:a="http://schemas.openxmlformats.org/drawingml/2006/main" xmlns:r="http://schemas.openxmlformats.org/officeDocument/2006/relationships" xmlns:p="http://schemas.openxmlformats.org/presentationml/2006/main">
   <p:cSld>
     <p:spTree>
@@ -12023,7 +12424,315 @@
 </p:sld>
 </file>
 
-<file path=ppt/slides/slide14.xml><?xml version="1.0" encoding="utf-8"?>
+<file path=ppt/slides/slide15.xml><?xml version="1.0" encoding="utf-8"?>
+<p:sld xmlns:a="http://schemas.openxmlformats.org/drawingml/2006/main" xmlns:r="http://schemas.openxmlformats.org/officeDocument/2006/relationships" xmlns:p="http://schemas.openxmlformats.org/presentationml/2006/main">
+  <p:cSld>
+    <p:spTree>
+      <p:nvGrpSpPr>
+        <p:cNvPr id="1" name=""/>
+        <p:cNvGrpSpPr/>
+        <p:nvPr/>
+      </p:nvGrpSpPr>
+      <p:grpSpPr>
+        <a:xfrm>
+          <a:off x="0" y="0"/>
+          <a:ext cx="0" cy="0"/>
+          <a:chOff x="0" y="0"/>
+          <a:chExt cx="0" cy="0"/>
+        </a:xfrm>
+      </p:grpSpPr>
+      <p:sp>
+        <p:nvSpPr>
+          <p:cNvPr id="2" name="Content Placeholder 1">
+            <a:extLst>
+              <a:ext uri="{FF2B5EF4-FFF2-40B4-BE49-F238E27FC236}">
+                <a16:creationId xmlns:a16="http://schemas.microsoft.com/office/drawing/2014/main" id="{3E714662-3552-4C22-B9F4-54F5D6890DFB}"/>
+              </a:ext>
+            </a:extLst>
+          </p:cNvPr>
+          <p:cNvSpPr>
+            <a:spLocks noGrp="1"/>
+          </p:cNvSpPr>
+          <p:nvPr>
+            <p:ph idx="1"/>
+          </p:nvPr>
+        </p:nvSpPr>
+        <p:spPr/>
+        <p:txBody>
+          <a:bodyPr>
+            <a:normAutofit lnSpcReduction="10000"/>
+          </a:bodyPr>
+          <a:lstStyle/>
+          <a:p>
+            <a:r>
+              <a:rPr lang="en-US" dirty="0"/>
+              <a:t>Where to start:</a:t>
+            </a:r>
+          </a:p>
+          <a:p>
+            <a:pPr lvl="1"/>
+            <a:r>
+              <a:rPr lang="en-US" dirty="0"/>
+              <a:t>Export from existing Resource Group</a:t>
+            </a:r>
+          </a:p>
+          <a:p>
+            <a:pPr lvl="1"/>
+            <a:r>
+              <a:rPr lang="en-US" dirty="0"/>
+              <a:t>GitHub templates</a:t>
+            </a:r>
+          </a:p>
+          <a:p>
+            <a:pPr lvl="1"/>
+            <a:r>
+              <a:rPr lang="en-US" dirty="0"/>
+              <a:t>Visual Studio wizard</a:t>
+            </a:r>
+          </a:p>
+          <a:p>
+            <a:r>
+              <a:rPr lang="en-US" dirty="0"/>
+              <a:t>Parameters</a:t>
+            </a:r>
+          </a:p>
+          <a:p>
+            <a:r>
+              <a:rPr lang="en-US" dirty="0"/>
+              <a:t>Variables</a:t>
+            </a:r>
+          </a:p>
+          <a:p>
+            <a:r>
+              <a:rPr lang="en-US" dirty="0"/>
+              <a:t>Functions</a:t>
+            </a:r>
+          </a:p>
+          <a:p>
+            <a:r>
+              <a:rPr lang="en-US" dirty="0"/>
+              <a:t>References</a:t>
+            </a:r>
+          </a:p>
+          <a:p>
+            <a:r>
+              <a:rPr lang="en-US" dirty="0"/>
+              <a:t>Loop &amp; Conditionals</a:t>
+            </a:r>
+          </a:p>
+          <a:p>
+            <a:r>
+              <a:rPr lang="en-US" dirty="0"/>
+              <a:t>Dependencies</a:t>
+            </a:r>
+          </a:p>
+        </p:txBody>
+      </p:sp>
+      <p:sp>
+        <p:nvSpPr>
+          <p:cNvPr id="3" name="Title 2">
+            <a:extLst>
+              <a:ext uri="{FF2B5EF4-FFF2-40B4-BE49-F238E27FC236}">
+                <a16:creationId xmlns:a16="http://schemas.microsoft.com/office/drawing/2014/main" id="{63B25A0B-5D32-4729-BDA6-28C77E084239}"/>
+              </a:ext>
+            </a:extLst>
+          </p:cNvPr>
+          <p:cNvSpPr>
+            <a:spLocks noGrp="1"/>
+          </p:cNvSpPr>
+          <p:nvPr>
+            <p:ph type="title"/>
+          </p:nvPr>
+        </p:nvSpPr>
+        <p:spPr/>
+        <p:txBody>
+          <a:bodyPr/>
+          <a:lstStyle/>
+          <a:p>
+            <a:r>
+              <a:rPr lang="en-US" dirty="0"/>
+              <a:t>Summary</a:t>
+            </a:r>
+          </a:p>
+        </p:txBody>
+      </p:sp>
+    </p:spTree>
+    <p:extLst>
+      <p:ext uri="{BB962C8B-B14F-4D97-AF65-F5344CB8AC3E}">
+        <p14:creationId xmlns:p14="http://schemas.microsoft.com/office/powerpoint/2010/main" val="1033122700"/>
+      </p:ext>
+    </p:extLst>
+  </p:cSld>
+  <p:clrMapOvr>
+    <a:masterClrMapping/>
+  </p:clrMapOvr>
+</p:sld>
+</file>
+
+<file path=ppt/slides/slide16.xml><?xml version="1.0" encoding="utf-8"?>
+<p:sld xmlns:a="http://schemas.openxmlformats.org/drawingml/2006/main" xmlns:r="http://schemas.openxmlformats.org/officeDocument/2006/relationships" xmlns:p="http://schemas.openxmlformats.org/presentationml/2006/main">
+  <p:cSld>
+    <p:spTree>
+      <p:nvGrpSpPr>
+        <p:cNvPr id="1" name=""/>
+        <p:cNvGrpSpPr/>
+        <p:nvPr/>
+      </p:nvGrpSpPr>
+      <p:grpSpPr>
+        <a:xfrm>
+          <a:off x="0" y="0"/>
+          <a:ext cx="0" cy="0"/>
+          <a:chOff x="0" y="0"/>
+          <a:chExt cx="0" cy="0"/>
+        </a:xfrm>
+      </p:grpSpPr>
+      <p:sp>
+        <p:nvSpPr>
+          <p:cNvPr id="3" name="Title 2">
+            <a:extLst>
+              <a:ext uri="{FF2B5EF4-FFF2-40B4-BE49-F238E27FC236}">
+                <a16:creationId xmlns:a16="http://schemas.microsoft.com/office/drawing/2014/main" id="{40E31A21-D558-49BA-9E33-00F9B9E532AD}"/>
+              </a:ext>
+            </a:extLst>
+          </p:cNvPr>
+          <p:cNvSpPr>
+            <a:spLocks noGrp="1"/>
+          </p:cNvSpPr>
+          <p:nvPr>
+            <p:ph type="title"/>
+          </p:nvPr>
+        </p:nvSpPr>
+        <p:spPr/>
+        <p:txBody>
+          <a:bodyPr/>
+          <a:lstStyle/>
+          <a:p>
+            <a:r>
+              <a:rPr lang="es-ES" dirty="0" err="1"/>
+              <a:t>Learning</a:t>
+            </a:r>
+            <a:r>
+              <a:rPr lang="es-ES" dirty="0"/>
+              <a:t> </a:t>
+            </a:r>
+            <a:r>
+              <a:rPr lang="es-ES" dirty="0" err="1"/>
+              <a:t>Resources</a:t>
+            </a:r>
+            <a:endParaRPr lang="en-US" dirty="0"/>
+          </a:p>
+        </p:txBody>
+      </p:sp>
+      <p:sp>
+        <p:nvSpPr>
+          <p:cNvPr id="5" name="Content Placeholder 4">
+            <a:extLst>
+              <a:ext uri="{FF2B5EF4-FFF2-40B4-BE49-F238E27FC236}">
+                <a16:creationId xmlns:a16="http://schemas.microsoft.com/office/drawing/2014/main" id="{322CC2EA-6CC7-4A34-B3BC-6513E1FAFA17}"/>
+              </a:ext>
+            </a:extLst>
+          </p:cNvPr>
+          <p:cNvSpPr>
+            <a:spLocks noGrp="1"/>
+          </p:cNvSpPr>
+          <p:nvPr>
+            <p:ph idx="1"/>
+          </p:nvPr>
+        </p:nvSpPr>
+        <p:spPr/>
+        <p:txBody>
+          <a:bodyPr>
+            <a:normAutofit/>
+          </a:bodyPr>
+          <a:lstStyle/>
+          <a:p>
+            <a:pPr marL="0" indent="0">
+              <a:buNone/>
+            </a:pPr>
+            <a:r>
+              <a:rPr lang="en-US" sz="2000" dirty="0">
+                <a:hlinkClick r:id="rId2"/>
+              </a:rPr>
+              <a:t>https://azure.microsoft.com/en-gb/resources/templates/</a:t>
+            </a:r>
+            <a:endParaRPr lang="en-US" sz="2000" dirty="0"/>
+          </a:p>
+          <a:p>
+            <a:pPr marL="0" indent="0">
+              <a:buNone/>
+            </a:pPr>
+            <a:r>
+              <a:rPr lang="en-US" sz="2000" dirty="0">
+                <a:hlinkClick r:id="rId3"/>
+              </a:rPr>
+              <a:t>https://docs.microsoft.com/en-us/azure/azure-resource-manager/resource-group-template-functions</a:t>
+            </a:r>
+            <a:endParaRPr lang="en-US" sz="2000" dirty="0"/>
+          </a:p>
+          <a:p>
+            <a:pPr marL="0" indent="0">
+              <a:buNone/>
+            </a:pPr>
+            <a:r>
+              <a:rPr lang="en-US" sz="2000" dirty="0">
+                <a:hlinkClick r:id="rId4"/>
+              </a:rPr>
+              <a:t>https://docs.microsoft.com/en-us/azure/azure-resource-manager/resource-group-template-functions-resource#resourceid</a:t>
+            </a:r>
+            <a:endParaRPr lang="en-US" sz="2000" dirty="0"/>
+          </a:p>
+          <a:p>
+            <a:pPr marL="0" indent="0">
+              <a:buNone/>
+            </a:pPr>
+            <a:r>
+              <a:rPr lang="en-US" sz="2000" dirty="0">
+                <a:hlinkClick r:id="rId5"/>
+              </a:rPr>
+              <a:t>https://docs.microsoft.com/en-us/azure/azure-resource-manager/resource-group-template-functions-resource#reference</a:t>
+            </a:r>
+            <a:endParaRPr lang="en-US" sz="2000" dirty="0"/>
+          </a:p>
+          <a:p>
+            <a:pPr marL="0" indent="0">
+              <a:buNone/>
+            </a:pPr>
+            <a:r>
+              <a:rPr lang="en-US" sz="2000" dirty="0">
+                <a:hlinkClick r:id="rId6"/>
+              </a:rPr>
+              <a:t>https://docs.microsoft.com/en-us/azure/templates/</a:t>
+            </a:r>
+            <a:endParaRPr lang="en-US" sz="2000" dirty="0"/>
+          </a:p>
+          <a:p>
+            <a:pPr marL="0" indent="0">
+              <a:buNone/>
+            </a:pPr>
+            <a:r>
+              <a:rPr lang="en-US" sz="2000" dirty="0">
+                <a:hlinkClick r:id="rId7"/>
+              </a:rPr>
+              <a:t>https://github.com/Azure/azure-resource-manager-schemas/tree/master/schemas</a:t>
+            </a:r>
+            <a:endParaRPr lang="en-US" sz="2000" dirty="0"/>
+          </a:p>
+        </p:txBody>
+      </p:sp>
+    </p:spTree>
+    <p:extLst>
+      <p:ext uri="{BB962C8B-B14F-4D97-AF65-F5344CB8AC3E}">
+        <p14:creationId xmlns:p14="http://schemas.microsoft.com/office/powerpoint/2010/main" val="4015145828"/>
+      </p:ext>
+    </p:extLst>
+  </p:cSld>
+  <p:clrMapOvr>
+    <a:masterClrMapping/>
+  </p:clrMapOvr>
+</p:sld>
+</file>
+
+<file path=ppt/slides/slide17.xml><?xml version="1.0" encoding="utf-8"?>
 <p:sld xmlns:a="http://schemas.openxmlformats.org/drawingml/2006/main" xmlns:r="http://schemas.openxmlformats.org/officeDocument/2006/relationships" xmlns:p="http://schemas.openxmlformats.org/presentationml/2006/main">
   <p:cSld>
     <p:spTree>
@@ -12056,7 +12765,7 @@
 </p:sld>
 </file>
 
-<file path=ppt/slides/slide15.xml><?xml version="1.0" encoding="utf-8"?>
+<file path=ppt/slides/slide18.xml><?xml version="1.0" encoding="utf-8"?>
 <p:sld xmlns:a="http://schemas.openxmlformats.org/drawingml/2006/main" xmlns:r="http://schemas.openxmlformats.org/officeDocument/2006/relationships" xmlns:p="http://schemas.openxmlformats.org/presentationml/2006/main">
   <p:cSld>
     <p:spTree>
@@ -12211,7 +12920,7 @@
           <a:bodyPr/>
           <a:lstStyle/>
           <a:p>
-            <a:endParaRPr lang="es-ES"/>
+            <a:endParaRPr lang="es-ES" dirty="0"/>
           </a:p>
         </p:txBody>
       </p:sp>
@@ -12281,6 +12990,12 @@
             <a:endParaRPr lang="en-US" dirty="0"/>
           </a:p>
           <a:p>
+            <a:r>
+              <a:rPr lang="en-US" dirty="0">
+                <a:hlinkClick r:id="rId4"/>
+              </a:rPr>
+              <a:t>https://twitter.com/chesaivan</a:t>
+            </a:r>
             <a:endParaRPr lang="en-US" dirty="0"/>
           </a:p>
         </p:txBody>
@@ -12637,28 +13352,40 @@
       </p:grpSpPr>
       <p:sp>
         <p:nvSpPr>
-          <p:cNvPr id="2" name="Text Placeholder 1">
+          <p:cNvPr id="4" name="TextBox 3">
             <a:extLst>
               <a:ext uri="{FF2B5EF4-FFF2-40B4-BE49-F238E27FC236}">
-                <a16:creationId xmlns:a16="http://schemas.microsoft.com/office/drawing/2014/main" id="{24228185-43F1-4B59-8747-6DFB0C832E28}"/>
+                <a16:creationId xmlns:a16="http://schemas.microsoft.com/office/drawing/2014/main" id="{05591D31-04E6-4AC0-8958-8D9358E2C462}"/>
               </a:ext>
             </a:extLst>
           </p:cNvPr>
-          <p:cNvSpPr>
-            <a:spLocks noGrp="1"/>
-          </p:cNvSpPr>
-          <p:nvPr>
-            <p:ph type="body" sz="quarter" idx="11"/>
-          </p:nvPr>
-        </p:nvSpPr>
-        <p:spPr/>
+          <p:cNvSpPr txBox="1"/>
+          <p:nvPr/>
+        </p:nvSpPr>
+        <p:spPr>
+          <a:xfrm>
+            <a:off x="55418" y="3025833"/>
+            <a:ext cx="9088582" cy="461665"/>
+          </a:xfrm>
+          <a:prstGeom prst="rect">
+            <a:avLst/>
+          </a:prstGeom>
+          <a:noFill/>
+        </p:spPr>
         <p:txBody>
-          <a:bodyPr/>
+          <a:bodyPr wrap="square" rtlCol="0">
+            <a:spAutoFit/>
+          </a:bodyPr>
           <a:lstStyle/>
           <a:p>
-            <a:r>
-              <a:rPr lang="en-US" dirty="0"/>
-              <a:t>Azure ARM benefits</a:t>
+            <a:pPr algn="ctr"/>
+            <a:r>
+              <a:rPr lang="en-US" sz="2400" dirty="0">
+                <a:solidFill>
+                  <a:schemeClr val="bg1"/>
+                </a:solidFill>
+              </a:rPr>
+              <a:t>https://github.com/luismanez/azure-bootcamp-barcelona-2018</a:t>
             </a:r>
           </a:p>
         </p:txBody>
@@ -12666,7 +13393,7 @@
     </p:spTree>
     <p:extLst>
       <p:ext uri="{BB962C8B-B14F-4D97-AF65-F5344CB8AC3E}">
-        <p14:creationId xmlns:p14="http://schemas.microsoft.com/office/powerpoint/2010/main" val="3899896632"/>
+        <p14:creationId xmlns:p14="http://schemas.microsoft.com/office/powerpoint/2010/main" val="2956544826"/>
       </p:ext>
     </p:extLst>
   </p:cSld>
@@ -12695,10 +13422,10 @@
       </p:grpSpPr>
       <p:sp>
         <p:nvSpPr>
-          <p:cNvPr id="3" name="Title 2">
+          <p:cNvPr id="2" name="Text Placeholder 1">
             <a:extLst>
               <a:ext uri="{FF2B5EF4-FFF2-40B4-BE49-F238E27FC236}">
-                <a16:creationId xmlns:a16="http://schemas.microsoft.com/office/drawing/2014/main" id="{1AB88118-3C4F-497A-89A9-11D1CAEC39BC}"/>
+                <a16:creationId xmlns:a16="http://schemas.microsoft.com/office/drawing/2014/main" id="{24228185-43F1-4B59-8747-6DFB0C832E28}"/>
               </a:ext>
             </a:extLst>
           </p:cNvPr>
@@ -12706,7 +13433,7 @@
             <a:spLocks noGrp="1"/>
           </p:cNvSpPr>
           <p:nvPr>
-            <p:ph type="title"/>
+            <p:ph type="body" sz="quarter" idx="11"/>
           </p:nvPr>
         </p:nvSpPr>
         <p:spPr/>
@@ -12716,45 +13443,15 @@
           <a:p>
             <a:r>
               <a:rPr lang="en-US" dirty="0"/>
-              <a:t>Monolithic Applications</a:t>
+              <a:t>Azure ARM benefits</a:t>
             </a:r>
           </a:p>
         </p:txBody>
       </p:sp>
-      <p:pic>
-        <p:nvPicPr>
-          <p:cNvPr id="4" name="Picture 3">
-            <a:extLst>
-              <a:ext uri="{FF2B5EF4-FFF2-40B4-BE49-F238E27FC236}">
-                <a16:creationId xmlns:a16="http://schemas.microsoft.com/office/drawing/2014/main" id="{43586F70-15D1-47B9-8ADE-D786482400FD}"/>
-              </a:ext>
-            </a:extLst>
-          </p:cNvPr>
-          <p:cNvPicPr>
-            <a:picLocks noChangeAspect="1"/>
-          </p:cNvPicPr>
-          <p:nvPr/>
-        </p:nvPicPr>
-        <p:blipFill>
-          <a:blip r:embed="rId2"/>
-          <a:stretch>
-            <a:fillRect/>
-          </a:stretch>
-        </p:blipFill>
-        <p:spPr>
-          <a:xfrm>
-            <a:off x="3173601" y="1994164"/>
-            <a:ext cx="2796799" cy="3875513"/>
-          </a:xfrm>
-          <a:prstGeom prst="rect">
-            <a:avLst/>
-          </a:prstGeom>
-        </p:spPr>
-      </p:pic>
     </p:spTree>
     <p:extLst>
       <p:ext uri="{BB962C8B-B14F-4D97-AF65-F5344CB8AC3E}">
-        <p14:creationId xmlns:p14="http://schemas.microsoft.com/office/powerpoint/2010/main" val="114682436"/>
+        <p14:creationId xmlns:p14="http://schemas.microsoft.com/office/powerpoint/2010/main" val="3899896632"/>
       </p:ext>
     </p:extLst>
   </p:cSld>
@@ -12804,17 +13501,17 @@
           <a:p>
             <a:r>
               <a:rPr lang="en-US" dirty="0"/>
-              <a:t>Microservices Applications</a:t>
+              <a:t>Monolithic Applications</a:t>
             </a:r>
           </a:p>
         </p:txBody>
       </p:sp>
       <p:pic>
         <p:nvPicPr>
-          <p:cNvPr id="2" name="Picture 1">
+          <p:cNvPr id="4" name="Picture 3">
             <a:extLst>
               <a:ext uri="{FF2B5EF4-FFF2-40B4-BE49-F238E27FC236}">
-                <a16:creationId xmlns:a16="http://schemas.microsoft.com/office/drawing/2014/main" id="{CB9A3D82-3A4B-49A4-A9F1-9D9E0B168E1A}"/>
+                <a16:creationId xmlns:a16="http://schemas.microsoft.com/office/drawing/2014/main" id="{43586F70-15D1-47B9-8ADE-D786482400FD}"/>
               </a:ext>
             </a:extLst>
           </p:cNvPr>
@@ -12831,8 +13528,8 @@
         </p:blipFill>
         <p:spPr>
           <a:xfrm>
-            <a:off x="1440020" y="1985237"/>
-            <a:ext cx="6141188" cy="3665913"/>
+            <a:off x="3173601" y="1994164"/>
+            <a:ext cx="2796799" cy="3875513"/>
           </a:xfrm>
           <a:prstGeom prst="rect">
             <a:avLst/>
@@ -12842,7 +13539,7 @@
     </p:spTree>
     <p:extLst>
       <p:ext uri="{BB962C8B-B14F-4D97-AF65-F5344CB8AC3E}">
-        <p14:creationId xmlns:p14="http://schemas.microsoft.com/office/powerpoint/2010/main" val="4129268108"/>
+        <p14:creationId xmlns:p14="http://schemas.microsoft.com/office/powerpoint/2010/main" val="114682436"/>
       </p:ext>
     </p:extLst>
   </p:cSld>
@@ -12885,19 +13582,14 @@
             <p:ph type="title"/>
           </p:nvPr>
         </p:nvSpPr>
-        <p:spPr>
-          <a:xfrm>
-            <a:off x="205981" y="377271"/>
-            <a:ext cx="8309369" cy="994172"/>
-          </a:xfrm>
-        </p:spPr>
+        <p:spPr/>
         <p:txBody>
           <a:bodyPr/>
           <a:lstStyle/>
           <a:p>
             <a:r>
               <a:rPr lang="en-US" dirty="0"/>
-              <a:t>… and per environment</a:t>
+              <a:t>Microservices Applications</a:t>
             </a:r>
           </a:p>
         </p:txBody>
@@ -12924,302 +13616,8 @@
         </p:blipFill>
         <p:spPr>
           <a:xfrm>
-            <a:off x="205981" y="2125266"/>
-            <a:ext cx="2723651" cy="1625852"/>
-          </a:xfrm>
-          <a:prstGeom prst="rect">
-            <a:avLst/>
-          </a:prstGeom>
-          <a:solidFill>
-            <a:srgbClr val="FFFFFF">
-              <a:shade val="85000"/>
-            </a:srgbClr>
-          </a:solidFill>
-          <a:ln w="88900" cap="sq">
-            <a:solidFill>
-              <a:srgbClr val="FFFFFF"/>
-            </a:solidFill>
-            <a:miter lim="800000"/>
-          </a:ln>
-          <a:effectLst>
-            <a:outerShdw blurRad="55000" dist="18000" dir="5400000" algn="tl" rotWithShape="0">
-              <a:srgbClr val="000000">
-                <a:alpha val="40000"/>
-              </a:srgbClr>
-            </a:outerShdw>
-          </a:effectLst>
-          <a:scene3d>
-            <a:camera prst="orthographicFront"/>
-            <a:lightRig rig="twoPt" dir="t">
-              <a:rot lat="0" lon="0" rev="7200000"/>
-            </a:lightRig>
-          </a:scene3d>
-          <a:sp3d>
-            <a:bevelT w="25400" h="19050"/>
-            <a:contourClr>
-              <a:srgbClr val="FFFFFF"/>
-            </a:contourClr>
-          </a:sp3d>
-        </p:spPr>
-      </p:pic>
-      <p:pic>
-        <p:nvPicPr>
-          <p:cNvPr id="4" name="Picture 3">
-            <a:extLst>
-              <a:ext uri="{FF2B5EF4-FFF2-40B4-BE49-F238E27FC236}">
-                <a16:creationId xmlns:a16="http://schemas.microsoft.com/office/drawing/2014/main" id="{DF563D7A-BC87-4596-BA17-CEBBE3E6EAD1}"/>
-              </a:ext>
-            </a:extLst>
-          </p:cNvPr>
-          <p:cNvPicPr>
-            <a:picLocks noChangeAspect="1"/>
-          </p:cNvPicPr>
-          <p:nvPr/>
-        </p:nvPicPr>
-        <p:blipFill>
-          <a:blip r:embed="rId2"/>
-          <a:stretch>
-            <a:fillRect/>
-          </a:stretch>
-        </p:blipFill>
-        <p:spPr>
-          <a:xfrm>
-            <a:off x="3233890" y="2125266"/>
-            <a:ext cx="2723651" cy="1625852"/>
-          </a:xfrm>
-          <a:prstGeom prst="rect">
-            <a:avLst/>
-          </a:prstGeom>
-          <a:solidFill>
-            <a:srgbClr val="FFFFFF">
-              <a:shade val="85000"/>
-            </a:srgbClr>
-          </a:solidFill>
-          <a:ln w="88900" cap="sq">
-            <a:solidFill>
-              <a:srgbClr val="FFFFFF"/>
-            </a:solidFill>
-            <a:miter lim="800000"/>
-          </a:ln>
-          <a:effectLst>
-            <a:outerShdw blurRad="55000" dist="18000" dir="5400000" algn="tl" rotWithShape="0">
-              <a:srgbClr val="000000">
-                <a:alpha val="40000"/>
-              </a:srgbClr>
-            </a:outerShdw>
-          </a:effectLst>
-          <a:scene3d>
-            <a:camera prst="orthographicFront"/>
-            <a:lightRig rig="twoPt" dir="t">
-              <a:rot lat="0" lon="0" rev="7200000"/>
-            </a:lightRig>
-          </a:scene3d>
-          <a:sp3d>
-            <a:bevelT w="25400" h="19050"/>
-            <a:contourClr>
-              <a:srgbClr val="FFFFFF"/>
-            </a:contourClr>
-          </a:sp3d>
-        </p:spPr>
-      </p:pic>
-      <p:pic>
-        <p:nvPicPr>
-          <p:cNvPr id="5" name="Picture 4">
-            <a:extLst>
-              <a:ext uri="{FF2B5EF4-FFF2-40B4-BE49-F238E27FC236}">
-                <a16:creationId xmlns:a16="http://schemas.microsoft.com/office/drawing/2014/main" id="{34FA5048-23E2-47AC-AE9F-9861FBBE6170}"/>
-              </a:ext>
-            </a:extLst>
-          </p:cNvPr>
-          <p:cNvPicPr>
-            <a:picLocks noChangeAspect="1"/>
-          </p:cNvPicPr>
-          <p:nvPr/>
-        </p:nvPicPr>
-        <p:blipFill>
-          <a:blip r:embed="rId2"/>
-          <a:stretch>
-            <a:fillRect/>
-          </a:stretch>
-        </p:blipFill>
-        <p:spPr>
-          <a:xfrm>
-            <a:off x="6261800" y="2125266"/>
-            <a:ext cx="2723651" cy="1625852"/>
-          </a:xfrm>
-          <a:prstGeom prst="rect">
-            <a:avLst/>
-          </a:prstGeom>
-          <a:solidFill>
-            <a:srgbClr val="FFFFFF">
-              <a:shade val="85000"/>
-            </a:srgbClr>
-          </a:solidFill>
-          <a:ln w="88900" cap="sq">
-            <a:solidFill>
-              <a:srgbClr val="FFFFFF"/>
-            </a:solidFill>
-            <a:miter lim="800000"/>
-          </a:ln>
-          <a:effectLst>
-            <a:outerShdw blurRad="55000" dist="18000" dir="5400000" algn="tl" rotWithShape="0">
-              <a:srgbClr val="000000">
-                <a:alpha val="40000"/>
-              </a:srgbClr>
-            </a:outerShdw>
-          </a:effectLst>
-          <a:scene3d>
-            <a:camera prst="orthographicFront"/>
-            <a:lightRig rig="twoPt" dir="t">
-              <a:rot lat="0" lon="0" rev="7200000"/>
-            </a:lightRig>
-          </a:scene3d>
-          <a:sp3d>
-            <a:bevelT w="25400" h="19050"/>
-            <a:contourClr>
-              <a:srgbClr val="FFFFFF"/>
-            </a:contourClr>
-          </a:sp3d>
-        </p:spPr>
-      </p:pic>
-      <p:sp>
-        <p:nvSpPr>
-          <p:cNvPr id="7" name="TextBox 6">
-            <a:extLst>
-              <a:ext uri="{FF2B5EF4-FFF2-40B4-BE49-F238E27FC236}">
-                <a16:creationId xmlns:a16="http://schemas.microsoft.com/office/drawing/2014/main" id="{86A4BAF7-B668-4759-BD56-6B15F94B04E6}"/>
-              </a:ext>
-            </a:extLst>
-          </p:cNvPr>
-          <p:cNvSpPr txBox="1"/>
-          <p:nvPr/>
-        </p:nvSpPr>
-        <p:spPr>
-          <a:xfrm>
-            <a:off x="3233890" y="3881006"/>
-            <a:ext cx="2723651" cy="417713"/>
-          </a:xfrm>
-          <a:prstGeom prst="rect">
-            <a:avLst/>
-          </a:prstGeom>
-        </p:spPr>
-        <p:txBody>
-          <a:bodyPr vert="horz" wrap="square" lIns="68580" tIns="34290" rIns="68580" bIns="34290" rtlCol="0">
-            <a:noAutofit/>
-          </a:bodyPr>
-          <a:lstStyle/>
-          <a:p>
-            <a:pPr algn="ctr"/>
-            <a:r>
-              <a:rPr lang="es-ES" sz="2400" dirty="0"/>
-              <a:t>QA</a:t>
-            </a:r>
-            <a:endParaRPr lang="en-US" sz="2400" dirty="0"/>
-          </a:p>
-        </p:txBody>
-      </p:sp>
-      <p:sp>
-        <p:nvSpPr>
-          <p:cNvPr id="21" name="TextBox 20">
-            <a:extLst>
-              <a:ext uri="{FF2B5EF4-FFF2-40B4-BE49-F238E27FC236}">
-                <a16:creationId xmlns:a16="http://schemas.microsoft.com/office/drawing/2014/main" id="{C60DF88E-21D0-40E4-825F-F7C95ECE6D5A}"/>
-              </a:ext>
-            </a:extLst>
-          </p:cNvPr>
-          <p:cNvSpPr txBox="1"/>
-          <p:nvPr/>
-        </p:nvSpPr>
-        <p:spPr>
-          <a:xfrm>
-            <a:off x="205981" y="3881006"/>
-            <a:ext cx="2723651" cy="417713"/>
-          </a:xfrm>
-          <a:prstGeom prst="rect">
-            <a:avLst/>
-          </a:prstGeom>
-        </p:spPr>
-        <p:txBody>
-          <a:bodyPr vert="horz" wrap="square" lIns="68580" tIns="34290" rIns="68580" bIns="34290" rtlCol="0">
-            <a:noAutofit/>
-          </a:bodyPr>
-          <a:lstStyle/>
-          <a:p>
-            <a:pPr algn="ctr"/>
-            <a:r>
-              <a:rPr lang="es-ES" sz="2400" dirty="0"/>
-              <a:t>DEV</a:t>
-            </a:r>
-            <a:endParaRPr lang="en-US" sz="2400" dirty="0"/>
-          </a:p>
-        </p:txBody>
-      </p:sp>
-      <p:sp>
-        <p:nvSpPr>
-          <p:cNvPr id="22" name="TextBox 21">
-            <a:extLst>
-              <a:ext uri="{FF2B5EF4-FFF2-40B4-BE49-F238E27FC236}">
-                <a16:creationId xmlns:a16="http://schemas.microsoft.com/office/drawing/2014/main" id="{4F0AEEF0-5D42-4DF5-AB60-DFB19F4FBA9A}"/>
-              </a:ext>
-            </a:extLst>
-          </p:cNvPr>
-          <p:cNvSpPr txBox="1"/>
-          <p:nvPr/>
-        </p:nvSpPr>
-        <p:spPr>
-          <a:xfrm>
-            <a:off x="6261800" y="3881006"/>
-            <a:ext cx="2723651" cy="417713"/>
-          </a:xfrm>
-          <a:prstGeom prst="rect">
-            <a:avLst/>
-          </a:prstGeom>
-        </p:spPr>
-        <p:txBody>
-          <a:bodyPr vert="horz" wrap="square" lIns="68580" tIns="34290" rIns="68580" bIns="34290" rtlCol="0">
-            <a:normAutofit/>
-          </a:bodyPr>
-          <a:lstStyle/>
-          <a:p>
-            <a:pPr algn="ctr"/>
-            <a:r>
-              <a:rPr lang="es-ES" sz="2100" dirty="0"/>
-              <a:t>PROD</a:t>
-            </a:r>
-            <a:endParaRPr lang="en-US" sz="2100" dirty="0"/>
-          </a:p>
-        </p:txBody>
-      </p:sp>
-      <p:pic>
-        <p:nvPicPr>
-          <p:cNvPr id="8" name="Picture 7">
-            <a:extLst>
-              <a:ext uri="{FF2B5EF4-FFF2-40B4-BE49-F238E27FC236}">
-                <a16:creationId xmlns:a16="http://schemas.microsoft.com/office/drawing/2014/main" id="{454FCC22-BFD5-496E-A30C-7B0F7D9D0473}"/>
-              </a:ext>
-            </a:extLst>
-          </p:cNvPr>
-          <p:cNvPicPr>
-            <a:picLocks noChangeAspect="1"/>
-          </p:cNvPicPr>
-          <p:nvPr/>
-        </p:nvPicPr>
-        <p:blipFill>
-          <a:blip r:embed="rId3">
-            <a:extLst>
-              <a:ext uri="{28A0092B-C50C-407E-A947-70E740481C1C}">
-                <a14:useLocalDpi xmlns:a14="http://schemas.microsoft.com/office/drawing/2010/main" val="0"/>
-              </a:ext>
-            </a:extLst>
-          </a:blip>
-          <a:stretch>
-            <a:fillRect/>
-          </a:stretch>
-        </p:blipFill>
-        <p:spPr>
-          <a:xfrm>
-            <a:off x="3338416" y="3881005"/>
-            <a:ext cx="2514600" cy="1785938"/>
+            <a:off x="1440020" y="1985237"/>
+            <a:ext cx="6141188" cy="3665913"/>
           </a:xfrm>
           <a:prstGeom prst="rect">
             <a:avLst/>
@@ -13229,88 +13627,13 @@
     </p:spTree>
     <p:extLst>
       <p:ext uri="{BB962C8B-B14F-4D97-AF65-F5344CB8AC3E}">
-        <p14:creationId xmlns:p14="http://schemas.microsoft.com/office/powerpoint/2010/main" val="2858387605"/>
+        <p14:creationId xmlns:p14="http://schemas.microsoft.com/office/powerpoint/2010/main" val="4129268108"/>
       </p:ext>
     </p:extLst>
   </p:cSld>
   <p:clrMapOvr>
     <a:masterClrMapping/>
   </p:clrMapOvr>
-  <p:timing>
-    <p:tnLst>
-      <p:par>
-        <p:cTn id="1" dur="indefinite" restart="never" nodeType="tmRoot">
-          <p:childTnLst>
-            <p:seq concurrent="1" nextAc="seek">
-              <p:cTn id="2" dur="indefinite" nodeType="mainSeq">
-                <p:childTnLst>
-                  <p:par>
-                    <p:cTn id="3" fill="hold">
-                      <p:stCondLst>
-                        <p:cond delay="indefinite"/>
-                      </p:stCondLst>
-                      <p:childTnLst>
-                        <p:par>
-                          <p:cTn id="4" fill="hold">
-                            <p:stCondLst>
-                              <p:cond delay="0"/>
-                            </p:stCondLst>
-                            <p:childTnLst>
-                              <p:par>
-                                <p:cTn id="5" presetID="1" presetClass="entr" presetSubtype="0" fill="hold" nodeType="clickEffect">
-                                  <p:stCondLst>
-                                    <p:cond delay="0"/>
-                                  </p:stCondLst>
-                                  <p:childTnLst>
-                                    <p:set>
-                                      <p:cBhvr>
-                                        <p:cTn id="6" dur="1" fill="hold">
-                                          <p:stCondLst>
-                                            <p:cond delay="0"/>
-                                          </p:stCondLst>
-                                        </p:cTn>
-                                        <p:tgtEl>
-                                          <p:spTgt spid="8"/>
-                                        </p:tgtEl>
-                                        <p:attrNameLst>
-                                          <p:attrName>style.visibility</p:attrName>
-                                        </p:attrNameLst>
-                                      </p:cBhvr>
-                                      <p:to>
-                                        <p:strVal val="visible"/>
-                                      </p:to>
-                                    </p:set>
-                                  </p:childTnLst>
-                                </p:cTn>
-                              </p:par>
-                            </p:childTnLst>
-                          </p:cTn>
-                        </p:par>
-                      </p:childTnLst>
-                    </p:cTn>
-                  </p:par>
-                </p:childTnLst>
-              </p:cTn>
-              <p:prevCondLst>
-                <p:cond evt="onPrev" delay="0">
-                  <p:tgtEl>
-                    <p:sldTgt/>
-                  </p:tgtEl>
-                </p:cond>
-              </p:prevCondLst>
-              <p:nextCondLst>
-                <p:cond evt="onNext" delay="0">
-                  <p:tgtEl>
-                    <p:sldTgt/>
-                  </p:tgtEl>
-                </p:cond>
-              </p:nextCondLst>
-            </p:seq>
-          </p:childTnLst>
-        </p:cTn>
-      </p:par>
-    </p:tnLst>
-  </p:timing>
 </p:sld>
 </file>
 

</xml_diff>